<commit_message>
Project Report updated spelling
</commit_message>
<xml_diff>
--- a/Module 1 Deliverables/CS_633_Zac3_term_project_report_module1.pptx
+++ b/Module 1 Deliverables/CS_633_Zac3_term_project_report_module1.pptx
@@ -105,7 +105,27 @@
       </a:defRPr>
     </a:lvl9pPr>
   </p:defaultTextStyle>
+  <p:extLst>
+    <p:ext uri="{EFAFB233-063F-42B5-8137-9DF3F51BA10A}">
+      <p15:sldGuideLst xmlns:p15="http://schemas.microsoft.com/office/powerpoint/2012/main">
+        <p15:guide id="1" orient="horz" pos="2160">
+          <p15:clr>
+            <a:srgbClr val="A4A3A4"/>
+          </p15:clr>
+        </p15:guide>
+        <p15:guide id="2" pos="2880">
+          <p15:clr>
+            <a:srgbClr val="A4A3A4"/>
+          </p15:clr>
+        </p15:guide>
+      </p15:sldGuideLst>
+    </p:ext>
+  </p:extLst>
 </p:presentation>
+</file>
+
+<file path=ppt/revisionInfo.xml><?xml version="1.0" encoding="utf-8"?>
+<p1510:revInfo xmlns:a="http://schemas.openxmlformats.org/drawingml/2006/main" xmlns:r="http://schemas.openxmlformats.org/officeDocument/2006/relationships" xmlns:p1510="http://schemas.microsoft.com/office/powerpoint/2015/10/main"/>
 </file>
 
 <file path=ppt/slideLayouts/slideLayout1.xml><?xml version="1.0" encoding="utf-8"?>
@@ -297,10 +317,9 @@
           </a:lstStyle>
           <a:p>
             <a:r>
-              <a:rPr kumimoji="0" lang="en-US" smtClean="0"/>
+              <a:rPr kumimoji="0" lang="en-US"/>
               <a:t>Click to edit Master title style</a:t>
             </a:r>
-            <a:endParaRPr kumimoji="0" lang="en-US"/>
           </a:p>
         </p:txBody>
       </p:sp>
@@ -360,10 +379,9 @@
           </a:lstStyle>
           <a:p>
             <a:r>
-              <a:rPr kumimoji="0" lang="en-US" smtClean="0"/>
+              <a:rPr kumimoji="0" lang="en-US"/>
               <a:t>Click to edit Master subtitle style</a:t>
             </a:r>
-            <a:endParaRPr kumimoji="0" lang="en-US"/>
           </a:p>
         </p:txBody>
       </p:sp>
@@ -399,7 +417,7 @@
           <a:p>
             <a:fld id="{CBBBF805-5D4B-8F4E-93F2-E4965DAE73BF}" type="datetimeFigureOut">
               <a:rPr lang="en-US" smtClean="0"/>
-              <a:t>2018-01-22</a:t>
+              <a:t>1/22/2018</a:t>
             </a:fld>
             <a:endParaRPr lang="en-US"/>
           </a:p>
@@ -514,10 +532,9 @@
           <a:lstStyle/>
           <a:p>
             <a:r>
-              <a:rPr kumimoji="0" lang="en-US" smtClean="0"/>
+              <a:rPr kumimoji="0" lang="en-US"/>
               <a:t>Click to edit Master title style</a:t>
             </a:r>
-            <a:endParaRPr kumimoji="0" lang="en-US"/>
           </a:p>
         </p:txBody>
       </p:sp>
@@ -538,35 +555,35 @@
           <a:p>
             <a:pPr lvl="0" eaLnBrk="1" latinLnBrk="0" hangingPunct="1"/>
             <a:r>
-              <a:rPr lang="en-US" smtClean="0"/>
+              <a:rPr lang="en-US"/>
               <a:t>Click to edit Master text styles</a:t>
             </a:r>
           </a:p>
           <a:p>
             <a:pPr lvl="1" eaLnBrk="1" latinLnBrk="0" hangingPunct="1"/>
             <a:r>
-              <a:rPr lang="en-US" smtClean="0"/>
+              <a:rPr lang="en-US"/>
               <a:t>Second level</a:t>
             </a:r>
           </a:p>
           <a:p>
             <a:pPr lvl="2" eaLnBrk="1" latinLnBrk="0" hangingPunct="1"/>
             <a:r>
-              <a:rPr lang="en-US" smtClean="0"/>
+              <a:rPr lang="en-US"/>
               <a:t>Third level</a:t>
             </a:r>
           </a:p>
           <a:p>
             <a:pPr lvl="3" eaLnBrk="1" latinLnBrk="0" hangingPunct="1"/>
             <a:r>
-              <a:rPr lang="en-US" smtClean="0"/>
+              <a:rPr lang="en-US"/>
               <a:t>Fourth level</a:t>
             </a:r>
           </a:p>
           <a:p>
             <a:pPr lvl="4" eaLnBrk="1" latinLnBrk="0" hangingPunct="1"/>
             <a:r>
-              <a:rPr lang="en-US" smtClean="0"/>
+              <a:rPr lang="en-US"/>
               <a:t>Fifth level</a:t>
             </a:r>
             <a:endParaRPr kumimoji="0" lang="en-US"/>
@@ -590,7 +607,7 @@
           <a:p>
             <a:fld id="{CBBBF805-5D4B-8F4E-93F2-E4965DAE73BF}" type="datetimeFigureOut">
               <a:rPr lang="en-US" smtClean="0"/>
-              <a:t>2018-01-22</a:t>
+              <a:t>1/22/2018</a:t>
             </a:fld>
             <a:endParaRPr lang="en-US"/>
           </a:p>
@@ -689,10 +706,9 @@
           <a:lstStyle/>
           <a:p>
             <a:r>
-              <a:rPr kumimoji="0" lang="en-US" smtClean="0"/>
+              <a:rPr kumimoji="0" lang="en-US"/>
               <a:t>Click to edit Master title style</a:t>
             </a:r>
-            <a:endParaRPr kumimoji="0" lang="en-US"/>
           </a:p>
         </p:txBody>
       </p:sp>
@@ -718,35 +734,35 @@
           <a:p>
             <a:pPr lvl="0" eaLnBrk="1" latinLnBrk="0" hangingPunct="1"/>
             <a:r>
-              <a:rPr lang="en-US" smtClean="0"/>
+              <a:rPr lang="en-US"/>
               <a:t>Click to edit Master text styles</a:t>
             </a:r>
           </a:p>
           <a:p>
             <a:pPr lvl="1" eaLnBrk="1" latinLnBrk="0" hangingPunct="1"/>
             <a:r>
-              <a:rPr lang="en-US" smtClean="0"/>
+              <a:rPr lang="en-US"/>
               <a:t>Second level</a:t>
             </a:r>
           </a:p>
           <a:p>
             <a:pPr lvl="2" eaLnBrk="1" latinLnBrk="0" hangingPunct="1"/>
             <a:r>
-              <a:rPr lang="en-US" smtClean="0"/>
+              <a:rPr lang="en-US"/>
               <a:t>Third level</a:t>
             </a:r>
           </a:p>
           <a:p>
             <a:pPr lvl="3" eaLnBrk="1" latinLnBrk="0" hangingPunct="1"/>
             <a:r>
-              <a:rPr lang="en-US" smtClean="0"/>
+              <a:rPr lang="en-US"/>
               <a:t>Fourth level</a:t>
             </a:r>
           </a:p>
           <a:p>
             <a:pPr lvl="4" eaLnBrk="1" latinLnBrk="0" hangingPunct="1"/>
             <a:r>
-              <a:rPr lang="en-US" smtClean="0"/>
+              <a:rPr lang="en-US"/>
               <a:t>Fifth level</a:t>
             </a:r>
             <a:endParaRPr kumimoji="0" lang="en-US"/>
@@ -775,7 +791,7 @@
           <a:p>
             <a:fld id="{CBBBF805-5D4B-8F4E-93F2-E4965DAE73BF}" type="datetimeFigureOut">
               <a:rPr lang="en-US" smtClean="0"/>
-              <a:t>2018-01-22</a:t>
+              <a:t>1/22/2018</a:t>
             </a:fld>
             <a:endParaRPr lang="en-US"/>
           </a:p>
@@ -1014,10 +1030,9 @@
           <a:lstStyle/>
           <a:p>
             <a:r>
-              <a:rPr kumimoji="0" lang="en-US" smtClean="0"/>
+              <a:rPr kumimoji="0" lang="en-US"/>
               <a:t>Click to edit Master title style</a:t>
             </a:r>
-            <a:endParaRPr kumimoji="0" lang="en-US"/>
           </a:p>
         </p:txBody>
       </p:sp>
@@ -1038,7 +1053,7 @@
           <a:p>
             <a:fld id="{CBBBF805-5D4B-8F4E-93F2-E4965DAE73BF}" type="datetimeFigureOut">
               <a:rPr lang="en-US" smtClean="0"/>
-              <a:t>2018-01-22</a:t>
+              <a:t>1/22/2018</a:t>
             </a:fld>
             <a:endParaRPr lang="en-US"/>
           </a:p>
@@ -1116,35 +1131,35 @@
           <a:p>
             <a:pPr lvl="0" eaLnBrk="1" latinLnBrk="0" hangingPunct="1"/>
             <a:r>
-              <a:rPr lang="en-US" smtClean="0"/>
+              <a:rPr lang="en-US"/>
               <a:t>Click to edit Master text styles</a:t>
             </a:r>
           </a:p>
           <a:p>
             <a:pPr lvl="1" eaLnBrk="1" latinLnBrk="0" hangingPunct="1"/>
             <a:r>
-              <a:rPr lang="en-US" smtClean="0"/>
+              <a:rPr lang="en-US"/>
               <a:t>Second level</a:t>
             </a:r>
           </a:p>
           <a:p>
             <a:pPr lvl="2" eaLnBrk="1" latinLnBrk="0" hangingPunct="1"/>
             <a:r>
-              <a:rPr lang="en-US" smtClean="0"/>
+              <a:rPr lang="en-US"/>
               <a:t>Third level</a:t>
             </a:r>
           </a:p>
           <a:p>
             <a:pPr lvl="3" eaLnBrk="1" latinLnBrk="0" hangingPunct="1"/>
             <a:r>
-              <a:rPr lang="en-US" smtClean="0"/>
+              <a:rPr lang="en-US"/>
               <a:t>Fourth level</a:t>
             </a:r>
           </a:p>
           <a:p>
             <a:pPr lvl="4" eaLnBrk="1" latinLnBrk="0" hangingPunct="1"/>
             <a:r>
-              <a:rPr lang="en-US" smtClean="0"/>
+              <a:rPr lang="en-US"/>
               <a:t>Fifth level</a:t>
             </a:r>
             <a:endParaRPr kumimoji="0" lang="en-US"/>
@@ -1252,7 +1267,7 @@
           <a:p>
             <a:pPr lvl="0" eaLnBrk="1" latinLnBrk="0" hangingPunct="1"/>
             <a:r>
-              <a:rPr kumimoji="0" lang="en-US" smtClean="0"/>
+              <a:rPr kumimoji="0" lang="en-US"/>
               <a:t>Click to edit Master text styles</a:t>
             </a:r>
           </a:p>
@@ -1430,10 +1445,9 @@
           </a:lstStyle>
           <a:p>
             <a:r>
-              <a:rPr kumimoji="0" lang="en-US" smtClean="0"/>
+              <a:rPr kumimoji="0" lang="en-US"/>
               <a:t>Click to edit Master title style</a:t>
             </a:r>
-            <a:endParaRPr kumimoji="0" lang="en-US"/>
           </a:p>
         </p:txBody>
       </p:sp>
@@ -1454,7 +1468,7 @@
           <a:p>
             <a:fld id="{CBBBF805-5D4B-8F4E-93F2-E4965DAE73BF}" type="datetimeFigureOut">
               <a:rPr lang="en-US" smtClean="0"/>
-              <a:t>2018-01-22</a:t>
+              <a:t>1/22/2018</a:t>
             </a:fld>
             <a:endParaRPr lang="en-US"/>
           </a:p>
@@ -1558,10 +1572,9 @@
           <a:lstStyle/>
           <a:p>
             <a:r>
-              <a:rPr kumimoji="0" lang="en-US" smtClean="0"/>
+              <a:rPr kumimoji="0" lang="en-US"/>
               <a:t>Click to edit Master title style</a:t>
             </a:r>
-            <a:endParaRPr kumimoji="0" lang="en-US"/>
           </a:p>
         </p:txBody>
       </p:sp>
@@ -1587,35 +1600,35 @@
           <a:p>
             <a:pPr lvl="0" eaLnBrk="1" latinLnBrk="0" hangingPunct="1"/>
             <a:r>
-              <a:rPr lang="en-US" smtClean="0"/>
+              <a:rPr lang="en-US"/>
               <a:t>Click to edit Master text styles</a:t>
             </a:r>
           </a:p>
           <a:p>
             <a:pPr lvl="1" eaLnBrk="1" latinLnBrk="0" hangingPunct="1"/>
             <a:r>
-              <a:rPr lang="en-US" smtClean="0"/>
+              <a:rPr lang="en-US"/>
               <a:t>Second level</a:t>
             </a:r>
           </a:p>
           <a:p>
             <a:pPr lvl="2" eaLnBrk="1" latinLnBrk="0" hangingPunct="1"/>
             <a:r>
-              <a:rPr lang="en-US" smtClean="0"/>
+              <a:rPr lang="en-US"/>
               <a:t>Third level</a:t>
             </a:r>
           </a:p>
           <a:p>
             <a:pPr lvl="3" eaLnBrk="1" latinLnBrk="0" hangingPunct="1"/>
             <a:r>
-              <a:rPr lang="en-US" smtClean="0"/>
+              <a:rPr lang="en-US"/>
               <a:t>Fourth level</a:t>
             </a:r>
           </a:p>
           <a:p>
             <a:pPr lvl="4" eaLnBrk="1" latinLnBrk="0" hangingPunct="1"/>
             <a:r>
-              <a:rPr lang="en-US" smtClean="0"/>
+              <a:rPr lang="en-US"/>
               <a:t>Fifth level</a:t>
             </a:r>
             <a:endParaRPr kumimoji="0" lang="en-US"/>
@@ -1644,35 +1657,35 @@
           <a:p>
             <a:pPr lvl="0" eaLnBrk="1" latinLnBrk="0" hangingPunct="1"/>
             <a:r>
-              <a:rPr lang="en-US" smtClean="0"/>
+              <a:rPr lang="en-US"/>
               <a:t>Click to edit Master text styles</a:t>
             </a:r>
           </a:p>
           <a:p>
             <a:pPr lvl="1" eaLnBrk="1" latinLnBrk="0" hangingPunct="1"/>
             <a:r>
-              <a:rPr lang="en-US" smtClean="0"/>
+              <a:rPr lang="en-US"/>
               <a:t>Second level</a:t>
             </a:r>
           </a:p>
           <a:p>
             <a:pPr lvl="2" eaLnBrk="1" latinLnBrk="0" hangingPunct="1"/>
             <a:r>
-              <a:rPr lang="en-US" smtClean="0"/>
+              <a:rPr lang="en-US"/>
               <a:t>Third level</a:t>
             </a:r>
           </a:p>
           <a:p>
             <a:pPr lvl="3" eaLnBrk="1" latinLnBrk="0" hangingPunct="1"/>
             <a:r>
-              <a:rPr lang="en-US" smtClean="0"/>
+              <a:rPr lang="en-US"/>
               <a:t>Fourth level</a:t>
             </a:r>
           </a:p>
           <a:p>
             <a:pPr lvl="4" eaLnBrk="1" latinLnBrk="0" hangingPunct="1"/>
             <a:r>
-              <a:rPr lang="en-US" smtClean="0"/>
+              <a:rPr lang="en-US"/>
               <a:t>Fifth level</a:t>
             </a:r>
             <a:endParaRPr kumimoji="0" lang="en-US"/>
@@ -1696,7 +1709,7 @@
           <a:p>
             <a:fld id="{CBBBF805-5D4B-8F4E-93F2-E4965DAE73BF}" type="datetimeFigureOut">
               <a:rPr lang="en-US" smtClean="0"/>
-              <a:t>2018-01-22</a:t>
+              <a:t>1/22/2018</a:t>
             </a:fld>
             <a:endParaRPr lang="en-US"/>
           </a:p>
@@ -1794,10 +1807,9 @@
           </a:lstStyle>
           <a:p>
             <a:r>
-              <a:rPr kumimoji="0" lang="en-US" smtClean="0"/>
+              <a:rPr kumimoji="0" lang="en-US"/>
               <a:t>Click to edit Master title style</a:t>
             </a:r>
-            <a:endParaRPr kumimoji="0" lang="en-US"/>
           </a:p>
         </p:txBody>
       </p:sp>
@@ -1823,35 +1835,35 @@
           <a:p>
             <a:pPr lvl="0" eaLnBrk="1" latinLnBrk="0" hangingPunct="1"/>
             <a:r>
-              <a:rPr lang="en-US" smtClean="0"/>
+              <a:rPr lang="en-US"/>
               <a:t>Click to edit Master text styles</a:t>
             </a:r>
           </a:p>
           <a:p>
             <a:pPr lvl="1" eaLnBrk="1" latinLnBrk="0" hangingPunct="1"/>
             <a:r>
-              <a:rPr lang="en-US" smtClean="0"/>
+              <a:rPr lang="en-US"/>
               <a:t>Second level</a:t>
             </a:r>
           </a:p>
           <a:p>
             <a:pPr lvl="2" eaLnBrk="1" latinLnBrk="0" hangingPunct="1"/>
             <a:r>
-              <a:rPr lang="en-US" smtClean="0"/>
+              <a:rPr lang="en-US"/>
               <a:t>Third level</a:t>
             </a:r>
           </a:p>
           <a:p>
             <a:pPr lvl="3" eaLnBrk="1" latinLnBrk="0" hangingPunct="1"/>
             <a:r>
-              <a:rPr lang="en-US" smtClean="0"/>
+              <a:rPr lang="en-US"/>
               <a:t>Fourth level</a:t>
             </a:r>
           </a:p>
           <a:p>
             <a:pPr lvl="4" eaLnBrk="1" latinLnBrk="0" hangingPunct="1"/>
             <a:r>
-              <a:rPr lang="en-US" smtClean="0"/>
+              <a:rPr lang="en-US"/>
               <a:t>Fifth level</a:t>
             </a:r>
             <a:endParaRPr kumimoji="0" lang="en-US"/>
@@ -1880,35 +1892,35 @@
           <a:p>
             <a:pPr lvl="0" eaLnBrk="1" latinLnBrk="0" hangingPunct="1"/>
             <a:r>
-              <a:rPr lang="en-US" smtClean="0"/>
+              <a:rPr lang="en-US"/>
               <a:t>Click to edit Master text styles</a:t>
             </a:r>
           </a:p>
           <a:p>
             <a:pPr lvl="1" eaLnBrk="1" latinLnBrk="0" hangingPunct="1"/>
             <a:r>
-              <a:rPr lang="en-US" smtClean="0"/>
+              <a:rPr lang="en-US"/>
               <a:t>Second level</a:t>
             </a:r>
           </a:p>
           <a:p>
             <a:pPr lvl="2" eaLnBrk="1" latinLnBrk="0" hangingPunct="1"/>
             <a:r>
-              <a:rPr lang="en-US" smtClean="0"/>
+              <a:rPr lang="en-US"/>
               <a:t>Third level</a:t>
             </a:r>
           </a:p>
           <a:p>
             <a:pPr lvl="3" eaLnBrk="1" latinLnBrk="0" hangingPunct="1"/>
             <a:r>
-              <a:rPr lang="en-US" smtClean="0"/>
+              <a:rPr lang="en-US"/>
               <a:t>Fourth level</a:t>
             </a:r>
           </a:p>
           <a:p>
             <a:pPr lvl="4" eaLnBrk="1" latinLnBrk="0" hangingPunct="1"/>
             <a:r>
-              <a:rPr lang="en-US" smtClean="0"/>
+              <a:rPr lang="en-US"/>
               <a:t>Fifth level</a:t>
             </a:r>
             <a:endParaRPr kumimoji="0" lang="en-US"/>
@@ -1932,7 +1944,7 @@
           <a:p>
             <a:fld id="{CBBBF805-5D4B-8F4E-93F2-E4965DAE73BF}" type="datetimeFigureOut">
               <a:rPr lang="en-US" smtClean="0"/>
-              <a:t>2018-01-22</a:t>
+              <a:t>1/22/2018</a:t>
             </a:fld>
             <a:endParaRPr lang="en-US"/>
           </a:p>
@@ -2015,7 +2027,7 @@
           <a:p>
             <a:pPr lvl="0" eaLnBrk="1" latinLnBrk="0" hangingPunct="1"/>
             <a:r>
-              <a:rPr kumimoji="0" lang="en-US" smtClean="0"/>
+              <a:rPr kumimoji="0" lang="en-US"/>
               <a:t>Click to edit Master text styles</a:t>
             </a:r>
           </a:p>
@@ -2056,7 +2068,7 @@
           <a:p>
             <a:pPr lvl="0" eaLnBrk="1" latinLnBrk="0" hangingPunct="1"/>
             <a:r>
-              <a:rPr kumimoji="0" lang="en-US" smtClean="0"/>
+              <a:rPr kumimoji="0" lang="en-US"/>
               <a:t>Click to edit Master text styles</a:t>
             </a:r>
           </a:p>
@@ -2103,10 +2115,9 @@
           <a:lstStyle/>
           <a:p>
             <a:r>
-              <a:rPr kumimoji="0" lang="en-US" smtClean="0"/>
+              <a:rPr kumimoji="0" lang="en-US"/>
               <a:t>Click to edit Master title style</a:t>
             </a:r>
-            <a:endParaRPr kumimoji="0" lang="en-US"/>
           </a:p>
         </p:txBody>
       </p:sp>
@@ -2127,7 +2138,7 @@
           <a:p>
             <a:fld id="{CBBBF805-5D4B-8F4E-93F2-E4965DAE73BF}" type="datetimeFigureOut">
               <a:rPr lang="en-US" smtClean="0"/>
-              <a:t>2018-01-22</a:t>
+              <a:t>1/22/2018</a:t>
             </a:fld>
             <a:endParaRPr lang="en-US"/>
           </a:p>
@@ -2225,7 +2236,7 @@
           <a:p>
             <a:fld id="{CBBBF805-5D4B-8F4E-93F2-E4965DAE73BF}" type="datetimeFigureOut">
               <a:rPr lang="en-US" smtClean="0"/>
-              <a:t>2018-01-22</a:t>
+              <a:t>1/22/2018</a:t>
             </a:fld>
             <a:endParaRPr lang="en-US"/>
           </a:p>
@@ -2337,10 +2348,9 @@
           </a:lstStyle>
           <a:p>
             <a:r>
-              <a:rPr kumimoji="0" lang="en-US" smtClean="0"/>
+              <a:rPr kumimoji="0" lang="en-US"/>
               <a:t>Click to edit Master title style</a:t>
             </a:r>
-            <a:endParaRPr kumimoji="0" lang="en-US"/>
           </a:p>
         </p:txBody>
       </p:sp>
@@ -2361,7 +2371,7 @@
           <a:p>
             <a:fld id="{CBBBF805-5D4B-8F4E-93F2-E4965DAE73BF}" type="datetimeFigureOut">
               <a:rPr lang="en-US" smtClean="0"/>
-              <a:t>2018-01-22</a:t>
+              <a:t>1/22/2018</a:t>
             </a:fld>
             <a:endParaRPr lang="en-US"/>
           </a:p>
@@ -2485,7 +2495,7 @@
           <a:p>
             <a:pPr lvl="0" eaLnBrk="1" latinLnBrk="0" hangingPunct="1"/>
             <a:r>
-              <a:rPr kumimoji="0" lang="en-US" smtClean="0"/>
+              <a:rPr kumimoji="0" lang="en-US"/>
               <a:t>Click to edit Master text styles</a:t>
             </a:r>
           </a:p>
@@ -2513,35 +2523,35 @@
           <a:p>
             <a:pPr lvl="0" eaLnBrk="1" latinLnBrk="0" hangingPunct="1"/>
             <a:r>
-              <a:rPr lang="en-US" smtClean="0"/>
+              <a:rPr lang="en-US"/>
               <a:t>Click to edit Master text styles</a:t>
             </a:r>
           </a:p>
           <a:p>
             <a:pPr lvl="1" eaLnBrk="1" latinLnBrk="0" hangingPunct="1"/>
             <a:r>
-              <a:rPr lang="en-US" smtClean="0"/>
+              <a:rPr lang="en-US"/>
               <a:t>Second level</a:t>
             </a:r>
           </a:p>
           <a:p>
             <a:pPr lvl="2" eaLnBrk="1" latinLnBrk="0" hangingPunct="1"/>
             <a:r>
-              <a:rPr lang="en-US" smtClean="0"/>
+              <a:rPr lang="en-US"/>
               <a:t>Third level</a:t>
             </a:r>
           </a:p>
           <a:p>
             <a:pPr lvl="3" eaLnBrk="1" latinLnBrk="0" hangingPunct="1"/>
             <a:r>
-              <a:rPr lang="en-US" smtClean="0"/>
+              <a:rPr lang="en-US"/>
               <a:t>Fourth level</a:t>
             </a:r>
           </a:p>
           <a:p>
             <a:pPr lvl="4" eaLnBrk="1" latinLnBrk="0" hangingPunct="1"/>
             <a:r>
-              <a:rPr lang="en-US" smtClean="0"/>
+              <a:rPr lang="en-US"/>
               <a:t>Fifth level</a:t>
             </a:r>
             <a:endParaRPr kumimoji="0" lang="en-US"/>
@@ -2626,7 +2636,7 @@
           <a:p>
             <a:pPr lvl="0" eaLnBrk="1" latinLnBrk="0" hangingPunct="1"/>
             <a:r>
-              <a:rPr kumimoji="0" lang="en-US" smtClean="0"/>
+              <a:rPr kumimoji="0" lang="en-US"/>
               <a:t>Click to edit Master text styles</a:t>
             </a:r>
           </a:p>
@@ -2804,10 +2814,9 @@
           </a:lstStyle>
           <a:p>
             <a:r>
-              <a:rPr kumimoji="0" lang="en-US" smtClean="0"/>
+              <a:rPr kumimoji="0" lang="en-US"/>
               <a:t>Click to edit Master title style</a:t>
             </a:r>
-            <a:endParaRPr kumimoji="0" lang="en-US"/>
           </a:p>
         </p:txBody>
       </p:sp>
@@ -2879,7 +2888,7 @@
           <a:p>
             <a:fld id="{CBBBF805-5D4B-8F4E-93F2-E4965DAE73BF}" type="datetimeFigureOut">
               <a:rPr lang="en-US" smtClean="0"/>
-              <a:t>2018-01-22</a:t>
+              <a:t>1/22/2018</a:t>
             </a:fld>
             <a:endParaRPr lang="en-US"/>
           </a:p>
@@ -2975,7 +2984,7 @@
           </a:lstStyle>
           <a:p>
             <a:r>
-              <a:rPr kumimoji="0" lang="en-US" smtClean="0"/>
+              <a:rPr kumimoji="0" lang="en-US"/>
               <a:t>Drag picture to placeholder or click icon to add</a:t>
             </a:r>
             <a:endParaRPr kumimoji="0" lang="en-US" dirty="0"/>
@@ -3038,10 +3047,9 @@
           <a:lstStyle/>
           <a:p>
             <a:r>
-              <a:rPr kumimoji="0" lang="en-US" smtClean="0"/>
+              <a:rPr kumimoji="0" lang="en-US"/>
               <a:t>Click to edit Master title style</a:t>
             </a:r>
-            <a:endParaRPr kumimoji="0" lang="en-US"/>
           </a:p>
         </p:txBody>
       </p:sp>
@@ -3072,38 +3080,37 @@
           <a:p>
             <a:pPr lvl="0" eaLnBrk="1" latinLnBrk="0" hangingPunct="1"/>
             <a:r>
-              <a:rPr kumimoji="0" lang="en-US" smtClean="0"/>
+              <a:rPr kumimoji="0" lang="en-US"/>
               <a:t>Click to edit Master text styles</a:t>
             </a:r>
           </a:p>
           <a:p>
             <a:pPr lvl="1" eaLnBrk="1" latinLnBrk="0" hangingPunct="1"/>
             <a:r>
-              <a:rPr kumimoji="0" lang="en-US" smtClean="0"/>
+              <a:rPr kumimoji="0" lang="en-US"/>
               <a:t>Second level</a:t>
             </a:r>
           </a:p>
           <a:p>
             <a:pPr lvl="2" eaLnBrk="1" latinLnBrk="0" hangingPunct="1"/>
             <a:r>
-              <a:rPr kumimoji="0" lang="en-US" smtClean="0"/>
+              <a:rPr kumimoji="0" lang="en-US"/>
               <a:t>Third level</a:t>
             </a:r>
           </a:p>
           <a:p>
             <a:pPr lvl="3" eaLnBrk="1" latinLnBrk="0" hangingPunct="1"/>
             <a:r>
-              <a:rPr kumimoji="0" lang="en-US" smtClean="0"/>
+              <a:rPr kumimoji="0" lang="en-US"/>
               <a:t>Fourth level</a:t>
             </a:r>
           </a:p>
           <a:p>
             <a:pPr lvl="4" eaLnBrk="1" latinLnBrk="0" hangingPunct="1"/>
             <a:r>
-              <a:rPr kumimoji="0" lang="en-US" smtClean="0"/>
+              <a:rPr kumimoji="0" lang="en-US"/>
               <a:t>Fifth level</a:t>
             </a:r>
-            <a:endParaRPr kumimoji="0" lang="en-US"/>
           </a:p>
         </p:txBody>
       </p:sp>
@@ -3140,7 +3147,7 @@
           <a:p>
             <a:fld id="{CBBBF805-5D4B-8F4E-93F2-E4965DAE73BF}" type="datetimeFigureOut">
               <a:rPr lang="en-US" smtClean="0"/>
-              <a:t>2018-01-22</a:t>
+              <a:t>1/22/2018</a:t>
             </a:fld>
             <a:endParaRPr lang="en-US"/>
           </a:p>
@@ -3702,24 +3709,23 @@
           <a:lstStyle/>
           <a:p>
             <a:r>
-              <a:rPr lang="en-US" dirty="0" smtClean="0"/>
+              <a:rPr lang="en-US" dirty="0"/>
               <a:t>Term project report</a:t>
             </a:r>
             <a:br>
-              <a:rPr lang="en-US" dirty="0" smtClean="0"/>
+              <a:rPr lang="en-US" dirty="0"/>
             </a:br>
             <a:r>
-              <a:rPr lang="en-US" dirty="0" smtClean="0"/>
+              <a:rPr lang="en-US" dirty="0"/>
               <a:t>Met CS 633</a:t>
             </a:r>
             <a:br>
-              <a:rPr lang="en-US" dirty="0" smtClean="0"/>
+              <a:rPr lang="en-US" dirty="0"/>
             </a:br>
             <a:r>
-              <a:rPr lang="en-US" dirty="0" smtClean="0"/>
+              <a:rPr lang="en-US" dirty="0"/>
               <a:t>OL s 2018</a:t>
             </a:r>
-            <a:endParaRPr lang="en-US" dirty="0"/>
           </a:p>
         </p:txBody>
       </p:sp>
@@ -3739,10 +3745,9 @@
           <a:lstStyle/>
           <a:p>
             <a:r>
-              <a:rPr lang="en-US" dirty="0" smtClean="0"/>
+              <a:rPr lang="en-US" dirty="0"/>
               <a:t>Team Members: </a:t>
             </a:r>
-            <a:endParaRPr lang="en-US" dirty="0"/>
           </a:p>
         </p:txBody>
       </p:sp>
@@ -3778,29 +3783,13 @@
             </a:r>
             <a:r>
               <a:rPr lang="en-US" sz="1600" dirty="0"/>
-              <a:t> </a:t>
-            </a:r>
-            <a:r>
-              <a:rPr lang="en-US" sz="1600" dirty="0" smtClean="0"/>
-              <a:t>	Michael </a:t>
-            </a:r>
+              <a:t> 	Michael Smith</a:t>
+            </a:r>
+          </a:p>
+          <a:p>
             <a:r>
               <a:rPr lang="en-US" sz="1600" dirty="0"/>
-              <a:t>Smith</a:t>
-            </a:r>
-          </a:p>
-          <a:p>
-            <a:r>
-              <a:rPr lang="en-US" sz="1600" dirty="0"/>
-              <a:t>Patty </a:t>
-            </a:r>
-            <a:r>
-              <a:rPr lang="en-US" sz="1600" dirty="0" smtClean="0"/>
-              <a:t>Thrall			Gabriel </a:t>
-            </a:r>
-            <a:r>
-              <a:rPr lang="en-US" sz="1600" dirty="0"/>
-              <a:t>Rua </a:t>
+              <a:t>Patty Thrall			Gabriel Rua </a:t>
             </a:r>
           </a:p>
           <a:p>
@@ -4015,18 +4004,17 @@
           </a:lstStyle>
           <a:p>
             <a:r>
-              <a:rPr lang="en-US" dirty="0" smtClean="0"/>
+              <a:rPr lang="en-US" dirty="0"/>
               <a:t>Group: </a:t>
             </a:r>
             <a:r>
-              <a:rPr lang="en-US" dirty="0" err="1" smtClean="0"/>
+              <a:rPr lang="en-US" dirty="0" err="1"/>
               <a:t>Zac</a:t>
             </a:r>
             <a:r>
-              <a:rPr lang="en-US" dirty="0" smtClean="0"/>
+              <a:rPr lang="en-US" dirty="0"/>
               <a:t>(3)</a:t>
             </a:r>
-            <a:endParaRPr lang="en-US" dirty="0"/>
           </a:p>
         </p:txBody>
       </p:sp>
@@ -4040,13 +4028,6 @@
   <p:clrMapOvr>
     <a:masterClrMapping/>
   </p:clrMapOvr>
-  <p:timing>
-    <p:tnLst>
-      <p:par>
-        <p:cTn xmlns:p14="http://schemas.microsoft.com/office/powerpoint/2010/main" id="1" dur="indefinite" restart="never" nodeType="tmRoot"/>
-      </p:par>
-    </p:tnLst>
-  </p:timing>
 </p:sld>
 </file>
 
@@ -4083,10 +4064,9 @@
           <a:lstStyle/>
           <a:p>
             <a:r>
-              <a:rPr lang="en-US" dirty="0" smtClean="0"/>
+              <a:rPr lang="en-US" dirty="0"/>
               <a:t>Week 1- Summary</a:t>
             </a:r>
-            <a:endParaRPr lang="en-US" dirty="0"/>
           </a:p>
         </p:txBody>
       </p:sp>
@@ -4100,7 +4080,7 @@
             <p:ph sz="quarter" idx="1"/>
             <p:extLst>
               <p:ext uri="{D42A27DB-BD31-4B8C-83A1-F6EECF244321}">
-                <p14:modId xmlns:p14="http://schemas.microsoft.com/office/powerpoint/2010/main" val="248833831"/>
+                <p14:modId xmlns:p14="http://schemas.microsoft.com/office/powerpoint/2010/main" val="4134364015"/>
               </p:ext>
             </p:extLst>
           </p:nvPr>
@@ -4116,9 +4096,27 @@
                 <a:tableStyleId>{5C22544A-7EE6-4342-B048-85BDC9FD1C3A}</a:tableStyleId>
               </a:tblPr>
               <a:tblGrid>
-                <a:gridCol w="1684787"/>
-                <a:gridCol w="1398979"/>
-                <a:gridCol w="948888"/>
+                <a:gridCol w="1684787">
+                  <a:extLst>
+                    <a:ext uri="{9D8B030D-6E8A-4147-A177-3AD203B41FA5}">
+                      <a16:colId xmlns:a16="http://schemas.microsoft.com/office/drawing/2014/main" val="20000"/>
+                    </a:ext>
+                  </a:extLst>
+                </a:gridCol>
+                <a:gridCol w="1398979">
+                  <a:extLst>
+                    <a:ext uri="{9D8B030D-6E8A-4147-A177-3AD203B41FA5}">
+                      <a16:colId xmlns:a16="http://schemas.microsoft.com/office/drawing/2014/main" val="20001"/>
+                    </a:ext>
+                  </a:extLst>
+                </a:gridCol>
+                <a:gridCol w="948888">
+                  <a:extLst>
+                    <a:ext uri="{9D8B030D-6E8A-4147-A177-3AD203B41FA5}">
+                      <a16:colId xmlns:a16="http://schemas.microsoft.com/office/drawing/2014/main" val="20002"/>
+                    </a:ext>
+                  </a:extLst>
+                </a:gridCol>
               </a:tblGrid>
               <a:tr h="370840">
                 <a:tc>
@@ -4127,11 +4125,11 @@
                     <a:lstStyle/>
                     <a:p>
                       <a:r>
-                        <a:rPr lang="en-US" dirty="0" smtClean="0"/>
+                        <a:rPr lang="en-US" dirty="0"/>
                         <a:t>Team</a:t>
                       </a:r>
                       <a:r>
-                        <a:rPr lang="en-US" baseline="0" dirty="0" smtClean="0"/>
+                        <a:rPr lang="en-US" baseline="0" dirty="0"/>
                         <a:t> Member</a:t>
                       </a:r>
                       <a:endParaRPr lang="en-US" dirty="0"/>
@@ -4145,10 +4143,9 @@
                     <a:lstStyle/>
                     <a:p>
                       <a:r>
-                        <a:rPr lang="en-US" dirty="0" smtClean="0"/>
+                        <a:rPr lang="en-US" dirty="0"/>
                         <a:t>Role</a:t>
                       </a:r>
-                      <a:endParaRPr lang="en-US" dirty="0"/>
                     </a:p>
                   </a:txBody>
                   <a:tcPr marL="99101" marR="99101"/>
@@ -4159,14 +4156,18 @@
                     <a:lstStyle/>
                     <a:p>
                       <a:r>
-                        <a:rPr lang="en-US" dirty="0" smtClean="0"/>
+                        <a:rPr lang="en-US" dirty="0"/>
                         <a:t>Present</a:t>
                       </a:r>
-                      <a:endParaRPr lang="en-US" dirty="0"/>
                     </a:p>
                   </a:txBody>
                   <a:tcPr marL="99101" marR="99101"/>
                 </a:tc>
+                <a:extLst>
+                  <a:ext uri="{0D108BD9-81ED-4DB2-BD59-A6C34878D82A}">
+                    <a16:rowId xmlns:a16="http://schemas.microsoft.com/office/drawing/2014/main" val="10000"/>
+                  </a:ext>
+                </a:extLst>
               </a:tr>
               <a:tr h="370840">
                 <a:tc>
@@ -4175,14 +4176,13 @@
                     <a:lstStyle/>
                     <a:p>
                       <a:r>
-                        <a:rPr lang="en-US" dirty="0" err="1" smtClean="0"/>
+                        <a:rPr lang="en-US" dirty="0" err="1"/>
                         <a:t>Kalkcic</a:t>
                       </a:r>
                       <a:r>
-                        <a:rPr lang="en-US" dirty="0" smtClean="0"/>
+                        <a:rPr lang="en-US" dirty="0"/>
                         <a:t>, Y.</a:t>
                       </a:r>
-                      <a:endParaRPr lang="en-US" dirty="0"/>
                     </a:p>
                   </a:txBody>
                   <a:tcPr marL="99101" marR="99101"/>
@@ -4193,10 +4193,9 @@
                     <a:lstStyle/>
                     <a:p>
                       <a:r>
-                        <a:rPr lang="en-US" dirty="0" smtClean="0"/>
+                        <a:rPr lang="en-US" dirty="0"/>
                         <a:t>?</a:t>
                       </a:r>
-                      <a:endParaRPr lang="en-US" dirty="0"/>
                     </a:p>
                   </a:txBody>
                   <a:tcPr marL="99101" marR="99101"/>
@@ -4207,14 +4206,18 @@
                     <a:lstStyle/>
                     <a:p>
                       <a:r>
-                        <a:rPr lang="en-US" dirty="0" smtClean="0"/>
+                        <a:rPr lang="en-US" dirty="0"/>
                         <a:t>No</a:t>
                       </a:r>
-                      <a:endParaRPr lang="en-US" dirty="0"/>
                     </a:p>
                   </a:txBody>
                   <a:tcPr marL="99101" marR="99101"/>
                 </a:tc>
+                <a:extLst>
+                  <a:ext uri="{0D108BD9-81ED-4DB2-BD59-A6C34878D82A}">
+                    <a16:rowId xmlns:a16="http://schemas.microsoft.com/office/drawing/2014/main" val="10001"/>
+                  </a:ext>
+                </a:extLst>
               </a:tr>
               <a:tr h="370840">
                 <a:tc>
@@ -4223,10 +4226,9 @@
                     <a:lstStyle/>
                     <a:p>
                       <a:r>
-                        <a:rPr lang="en-US" dirty="0" smtClean="0"/>
+                        <a:rPr lang="en-US" dirty="0"/>
                         <a:t>Rua, G.</a:t>
                       </a:r>
-                      <a:endParaRPr lang="en-US" dirty="0"/>
                     </a:p>
                   </a:txBody>
                   <a:tcPr marL="99101" marR="99101"/>
@@ -4237,10 +4239,9 @@
                     <a:lstStyle/>
                     <a:p>
                       <a:r>
-                        <a:rPr lang="en-US" dirty="0" smtClean="0"/>
+                        <a:rPr lang="en-US" dirty="0"/>
                         <a:t>Requirements</a:t>
                       </a:r>
-                      <a:endParaRPr lang="en-US" dirty="0"/>
                     </a:p>
                   </a:txBody>
                   <a:tcPr marL="99101" marR="99101"/>
@@ -4251,14 +4252,18 @@
                     <a:lstStyle/>
                     <a:p>
                       <a:r>
-                        <a:rPr lang="en-US" dirty="0" smtClean="0"/>
+                        <a:rPr lang="en-US" dirty="0"/>
                         <a:t>Yes</a:t>
                       </a:r>
-                      <a:endParaRPr lang="en-US" dirty="0"/>
                     </a:p>
                   </a:txBody>
                   <a:tcPr marL="99101" marR="99101"/>
                 </a:tc>
+                <a:extLst>
+                  <a:ext uri="{0D108BD9-81ED-4DB2-BD59-A6C34878D82A}">
+                    <a16:rowId xmlns:a16="http://schemas.microsoft.com/office/drawing/2014/main" val="10002"/>
+                  </a:ext>
+                </a:extLst>
               </a:tr>
               <a:tr h="370840">
                 <a:tc>
@@ -4267,11 +4272,11 @@
                     <a:lstStyle/>
                     <a:p>
                       <a:r>
-                        <a:rPr lang="en-US" dirty="0" smtClean="0"/>
+                        <a:rPr lang="en-US" dirty="0"/>
                         <a:t>Smith,</a:t>
                       </a:r>
                       <a:r>
-                        <a:rPr lang="en-US" baseline="0" dirty="0" smtClean="0"/>
+                        <a:rPr lang="en-US" baseline="0" dirty="0"/>
                         <a:t> M.</a:t>
                       </a:r>
                       <a:endParaRPr lang="en-US" dirty="0"/>
@@ -4285,10 +4290,9 @@
                     <a:lstStyle/>
                     <a:p>
                       <a:r>
-                        <a:rPr lang="en-US" dirty="0" smtClean="0"/>
+                        <a:rPr lang="en-US" dirty="0"/>
                         <a:t>Developer</a:t>
                       </a:r>
-                      <a:endParaRPr lang="en-US" dirty="0"/>
                     </a:p>
                   </a:txBody>
                   <a:tcPr marL="99101" marR="99101"/>
@@ -4299,14 +4303,18 @@
                     <a:lstStyle/>
                     <a:p>
                       <a:r>
-                        <a:rPr lang="en-US" dirty="0" smtClean="0"/>
+                        <a:rPr lang="en-US" dirty="0"/>
                         <a:t>Yes</a:t>
                       </a:r>
-                      <a:endParaRPr lang="en-US" dirty="0"/>
                     </a:p>
                   </a:txBody>
                   <a:tcPr marL="99101" marR="99101"/>
                 </a:tc>
+                <a:extLst>
+                  <a:ext uri="{0D108BD9-81ED-4DB2-BD59-A6C34878D82A}">
+                    <a16:rowId xmlns:a16="http://schemas.microsoft.com/office/drawing/2014/main" val="10003"/>
+                  </a:ext>
+                </a:extLst>
               </a:tr>
               <a:tr h="752557">
                 <a:tc>
@@ -4315,10 +4323,9 @@
                     <a:lstStyle/>
                     <a:p>
                       <a:r>
-                        <a:rPr lang="en-US" dirty="0" smtClean="0"/>
+                        <a:rPr lang="en-US" dirty="0"/>
                         <a:t>Thrall, P.</a:t>
                       </a:r>
-                      <a:endParaRPr lang="en-US" dirty="0"/>
                     </a:p>
                   </a:txBody>
                   <a:tcPr marL="99101" marR="99101"/>
@@ -4329,10 +4336,9 @@
                     <a:lstStyle/>
                     <a:p>
                       <a:r>
-                        <a:rPr lang="en-US" dirty="0" smtClean="0"/>
+                        <a:rPr lang="en-US" dirty="0"/>
                         <a:t>Project Manager</a:t>
                       </a:r>
-                      <a:endParaRPr lang="en-US" dirty="0"/>
                     </a:p>
                   </a:txBody>
                   <a:tcPr marL="99101" marR="99101"/>
@@ -4343,14 +4349,18 @@
                     <a:lstStyle/>
                     <a:p>
                       <a:r>
-                        <a:rPr lang="en-US" dirty="0" smtClean="0"/>
+                        <a:rPr lang="en-US" dirty="0"/>
                         <a:t>Yes</a:t>
                       </a:r>
-                      <a:endParaRPr lang="en-US" dirty="0"/>
                     </a:p>
                   </a:txBody>
                   <a:tcPr marL="99101" marR="99101"/>
                 </a:tc>
+                <a:extLst>
+                  <a:ext uri="{0D108BD9-81ED-4DB2-BD59-A6C34878D82A}">
+                    <a16:rowId xmlns:a16="http://schemas.microsoft.com/office/drawing/2014/main" val="10004"/>
+                  </a:ext>
+                </a:extLst>
               </a:tr>
               <a:tr h="370840">
                 <a:tc>
@@ -4359,15 +4369,11 @@
                     <a:lstStyle/>
                     <a:p>
                       <a:r>
-                        <a:rPr lang="en-US" dirty="0" err="1" smtClean="0"/>
-                        <a:t>Vacarro</a:t>
+                        <a:rPr lang="en-US" dirty="0"/>
+                        <a:t>Vaccaro,</a:t>
                       </a:r>
                       <a:r>
-                        <a:rPr lang="en-US" dirty="0" smtClean="0"/>
-                        <a:t>,</a:t>
-                      </a:r>
-                      <a:r>
-                        <a:rPr lang="en-US" baseline="0" dirty="0" smtClean="0"/>
+                        <a:rPr lang="en-US" baseline="0" dirty="0"/>
                         <a:t> G.</a:t>
                       </a:r>
                       <a:endParaRPr lang="en-US" dirty="0"/>
@@ -4381,10 +4387,9 @@
                     <a:lstStyle/>
                     <a:p>
                       <a:r>
-                        <a:rPr lang="en-US" dirty="0" smtClean="0"/>
+                        <a:rPr lang="en-US" dirty="0"/>
                         <a:t>Tester</a:t>
                       </a:r>
-                      <a:endParaRPr lang="en-US" dirty="0"/>
                     </a:p>
                   </a:txBody>
                   <a:tcPr marL="99101" marR="99101"/>
@@ -4395,14 +4400,18 @@
                     <a:lstStyle/>
                     <a:p>
                       <a:r>
-                        <a:rPr lang="en-US" dirty="0" smtClean="0"/>
+                        <a:rPr lang="en-US" dirty="0"/>
                         <a:t>Yes</a:t>
                       </a:r>
-                      <a:endParaRPr lang="en-US" dirty="0"/>
                     </a:p>
                   </a:txBody>
                   <a:tcPr marL="99101" marR="99101"/>
                 </a:tc>
+                <a:extLst>
+                  <a:ext uri="{0D108BD9-81ED-4DB2-BD59-A6C34878D82A}">
+                    <a16:rowId xmlns:a16="http://schemas.microsoft.com/office/drawing/2014/main" val="10005"/>
+                  </a:ext>
+                </a:extLst>
               </a:tr>
             </a:tbl>
           </a:graphicData>
@@ -4434,8 +4443,20 @@
                 <a:tableStyleId>{5C22544A-7EE6-4342-B048-85BDC9FD1C3A}</a:tableStyleId>
               </a:tblPr>
               <a:tblGrid>
-                <a:gridCol w="2745430"/>
-                <a:gridCol w="1141085"/>
+                <a:gridCol w="2745430">
+                  <a:extLst>
+                    <a:ext uri="{9D8B030D-6E8A-4147-A177-3AD203B41FA5}">
+                      <a16:colId xmlns:a16="http://schemas.microsoft.com/office/drawing/2014/main" val="20000"/>
+                    </a:ext>
+                  </a:extLst>
+                </a:gridCol>
+                <a:gridCol w="1141085">
+                  <a:extLst>
+                    <a:ext uri="{9D8B030D-6E8A-4147-A177-3AD203B41FA5}">
+                      <a16:colId xmlns:a16="http://schemas.microsoft.com/office/drawing/2014/main" val="20001"/>
+                    </a:ext>
+                  </a:extLst>
+                </a:gridCol>
               </a:tblGrid>
               <a:tr h="370840">
                 <a:tc>
@@ -4444,10 +4465,9 @@
                     <a:lstStyle/>
                     <a:p>
                       <a:r>
-                        <a:rPr lang="en-US" dirty="0" smtClean="0"/>
+                        <a:rPr lang="en-US" dirty="0"/>
                         <a:t>Deliverable</a:t>
                       </a:r>
-                      <a:endParaRPr lang="en-US" dirty="0"/>
                     </a:p>
                   </a:txBody>
                   <a:tcPr marL="89252" marR="89252"/>
@@ -4458,14 +4478,18 @@
                     <a:lstStyle/>
                     <a:p>
                       <a:r>
-                        <a:rPr lang="en-US" dirty="0" smtClean="0"/>
+                        <a:rPr lang="en-US" dirty="0"/>
                         <a:t>Status</a:t>
                       </a:r>
-                      <a:endParaRPr lang="en-US" dirty="0"/>
                     </a:p>
                   </a:txBody>
                   <a:tcPr marL="89252" marR="89252"/>
                 </a:tc>
+                <a:extLst>
+                  <a:ext uri="{0D108BD9-81ED-4DB2-BD59-A6C34878D82A}">
+                    <a16:rowId xmlns:a16="http://schemas.microsoft.com/office/drawing/2014/main" val="10000"/>
+                  </a:ext>
+                </a:extLst>
               </a:tr>
               <a:tr h="370840">
                 <a:tc>
@@ -4474,11 +4498,11 @@
                     <a:lstStyle/>
                     <a:p>
                       <a:r>
-                        <a:rPr lang="en-US" dirty="0" smtClean="0"/>
+                        <a:rPr lang="en-US" dirty="0"/>
                         <a:t>Register</a:t>
                       </a:r>
                       <a:r>
-                        <a:rPr lang="en-US" baseline="0" dirty="0" smtClean="0"/>
+                        <a:rPr lang="en-US" baseline="0" dirty="0"/>
                         <a:t> with Pivotal</a:t>
                       </a:r>
                       <a:endParaRPr lang="en-US" dirty="0"/>
@@ -4492,14 +4516,18 @@
                     <a:lstStyle/>
                     <a:p>
                       <a:r>
-                        <a:rPr lang="en-US" dirty="0" smtClean="0"/>
+                        <a:rPr lang="en-US" dirty="0"/>
                         <a:t>Complete</a:t>
                       </a:r>
-                      <a:endParaRPr lang="en-US" dirty="0"/>
                     </a:p>
                   </a:txBody>
                   <a:tcPr marL="89252" marR="89252"/>
                 </a:tc>
+                <a:extLst>
+                  <a:ext uri="{0D108BD9-81ED-4DB2-BD59-A6C34878D82A}">
+                    <a16:rowId xmlns:a16="http://schemas.microsoft.com/office/drawing/2014/main" val="10001"/>
+                  </a:ext>
+                </a:extLst>
               </a:tr>
               <a:tr h="370840">
                 <a:tc>
@@ -4508,10 +4536,9 @@
                     <a:lstStyle/>
                     <a:p>
                       <a:r>
-                        <a:rPr lang="en-US" dirty="0" smtClean="0"/>
+                        <a:rPr lang="en-US" dirty="0"/>
                         <a:t>Create GIT account</a:t>
                       </a:r>
-                      <a:endParaRPr lang="en-US" dirty="0"/>
                     </a:p>
                   </a:txBody>
                   <a:tcPr marL="89252" marR="89252"/>
@@ -4522,14 +4549,18 @@
                     <a:lstStyle/>
                     <a:p>
                       <a:r>
-                        <a:rPr lang="en-US" dirty="0" smtClean="0"/>
+                        <a:rPr lang="en-US" dirty="0"/>
                         <a:t>Complete</a:t>
                       </a:r>
-                      <a:endParaRPr lang="en-US" dirty="0"/>
                     </a:p>
                   </a:txBody>
                   <a:tcPr marL="89252" marR="89252"/>
                 </a:tc>
+                <a:extLst>
+                  <a:ext uri="{0D108BD9-81ED-4DB2-BD59-A6C34878D82A}">
+                    <a16:rowId xmlns:a16="http://schemas.microsoft.com/office/drawing/2014/main" val="10002"/>
+                  </a:ext>
+                </a:extLst>
               </a:tr>
               <a:tr h="370840">
                 <a:tc>
@@ -4538,14 +4569,9 @@
                     <a:lstStyle/>
                     <a:p>
                       <a:r>
-                        <a:rPr lang="en-US" dirty="0" smtClean="0"/>
-                        <a:t>Start </a:t>
+                        <a:rPr lang="en-US" dirty="0"/>
+                        <a:t>Start Discussing</a:t>
                       </a:r>
-                      <a:r>
-                        <a:rPr lang="en-US" dirty="0" smtClean="0"/>
-                        <a:t>Discussing</a:t>
-                      </a:r>
-                      <a:endParaRPr lang="en-US" dirty="0"/>
                     </a:p>
                   </a:txBody>
                   <a:tcPr marL="89252" marR="89252"/>
@@ -4556,14 +4582,18 @@
                     <a:lstStyle/>
                     <a:p>
                       <a:r>
-                        <a:rPr lang="en-US" dirty="0" smtClean="0"/>
+                        <a:rPr lang="en-US" dirty="0"/>
                         <a:t>Complete</a:t>
                       </a:r>
-                      <a:endParaRPr lang="en-US" dirty="0"/>
                     </a:p>
                   </a:txBody>
                   <a:tcPr marL="89252" marR="89252"/>
                 </a:tc>
+                <a:extLst>
+                  <a:ext uri="{0D108BD9-81ED-4DB2-BD59-A6C34878D82A}">
+                    <a16:rowId xmlns:a16="http://schemas.microsoft.com/office/drawing/2014/main" val="10003"/>
+                  </a:ext>
+                </a:extLst>
               </a:tr>
               <a:tr h="370840">
                 <a:tc>
@@ -4572,10 +4602,9 @@
                     <a:lstStyle/>
                     <a:p>
                       <a:r>
-                        <a:rPr lang="en-US" dirty="0" smtClean="0"/>
+                        <a:rPr lang="en-US" dirty="0"/>
                         <a:t>Propose project scope</a:t>
                       </a:r>
-                      <a:endParaRPr lang="en-US" dirty="0"/>
                     </a:p>
                   </a:txBody>
                   <a:tcPr marL="89252" marR="89252"/>
@@ -4586,14 +4615,18 @@
                     <a:lstStyle/>
                     <a:p>
                       <a:r>
-                        <a:rPr lang="en-US" dirty="0" smtClean="0"/>
+                        <a:rPr lang="en-US" dirty="0"/>
                         <a:t>Complete</a:t>
                       </a:r>
-                      <a:endParaRPr lang="en-US" dirty="0"/>
                     </a:p>
                   </a:txBody>
                   <a:tcPr marL="89252" marR="89252"/>
                 </a:tc>
+                <a:extLst>
+                  <a:ext uri="{0D108BD9-81ED-4DB2-BD59-A6C34878D82A}">
+                    <a16:rowId xmlns:a16="http://schemas.microsoft.com/office/drawing/2014/main" val="10004"/>
+                  </a:ext>
+                </a:extLst>
               </a:tr>
               <a:tr h="370840">
                 <a:tc>
@@ -4602,10 +4635,9 @@
                     <a:lstStyle/>
                     <a:p>
                       <a:r>
-                        <a:rPr lang="en-US" dirty="0" smtClean="0"/>
+                        <a:rPr lang="en-US" dirty="0"/>
                         <a:t>Propose Team’s composition</a:t>
                       </a:r>
-                      <a:endParaRPr lang="en-US" dirty="0"/>
                     </a:p>
                   </a:txBody>
                   <a:tcPr marL="89252" marR="89252"/>
@@ -4616,14 +4648,18 @@
                     <a:lstStyle/>
                     <a:p>
                       <a:r>
-                        <a:rPr lang="en-US" dirty="0" smtClean="0"/>
+                        <a:rPr lang="en-US" dirty="0"/>
                         <a:t>Complete</a:t>
                       </a:r>
-                      <a:endParaRPr lang="en-US" dirty="0"/>
                     </a:p>
                   </a:txBody>
                   <a:tcPr marL="89252" marR="89252"/>
                 </a:tc>
+                <a:extLst>
+                  <a:ext uri="{0D108BD9-81ED-4DB2-BD59-A6C34878D82A}">
+                    <a16:rowId xmlns:a16="http://schemas.microsoft.com/office/drawing/2014/main" val="10005"/>
+                  </a:ext>
+                </a:extLst>
               </a:tr>
               <a:tr h="370840">
                 <a:tc>
@@ -4632,10 +4668,9 @@
                     <a:lstStyle/>
                     <a:p>
                       <a:r>
-                        <a:rPr lang="en-US" dirty="0" smtClean="0"/>
+                        <a:rPr lang="en-US" dirty="0"/>
                         <a:t>Distribute Initial Report</a:t>
                       </a:r>
-                      <a:endParaRPr lang="en-US" dirty="0"/>
                     </a:p>
                   </a:txBody>
                   <a:tcPr marL="89252" marR="89252"/>
@@ -4646,14 +4681,18 @@
                     <a:lstStyle/>
                     <a:p>
                       <a:r>
-                        <a:rPr lang="en-US" dirty="0" smtClean="0"/>
+                        <a:rPr lang="en-US" dirty="0"/>
                         <a:t>Complete</a:t>
                       </a:r>
-                      <a:endParaRPr lang="en-US" dirty="0"/>
                     </a:p>
                   </a:txBody>
                   <a:tcPr marL="89252" marR="89252"/>
                 </a:tc>
+                <a:extLst>
+                  <a:ext uri="{0D108BD9-81ED-4DB2-BD59-A6C34878D82A}">
+                    <a16:rowId xmlns:a16="http://schemas.microsoft.com/office/drawing/2014/main" val="10006"/>
+                  </a:ext>
+                </a:extLst>
               </a:tr>
             </a:tbl>
           </a:graphicData>
@@ -4682,26 +4721,25 @@
           <a:lstStyle/>
           <a:p>
             <a:r>
-              <a:rPr lang="en-US" sz="1400" u="sng" dirty="0" smtClean="0"/>
+              <a:rPr lang="en-US" sz="1400" u="sng" dirty="0"/>
               <a:t>Jan 21, 2018															</a:t>
             </a:r>
-            <a:endParaRPr lang="en-US" sz="1400" u="sng" dirty="0"/>
-          </a:p>
-          <a:p>
-            <a:r>
-              <a:rPr lang="en-US" sz="1400" dirty="0" smtClean="0"/>
+          </a:p>
+          <a:p>
+            <a:r>
+              <a:rPr lang="en-US" sz="1400" dirty="0"/>
               <a:t>The above team members met via Skype at 14:00 EST.  </a:t>
             </a:r>
           </a:p>
           <a:p>
             <a:r>
-              <a:rPr lang="en-US" sz="1400" dirty="0" smtClean="0"/>
+              <a:rPr lang="en-US" sz="1400" dirty="0"/>
               <a:t>The team decided on the roles each member would play on the term project.</a:t>
             </a:r>
           </a:p>
           <a:p>
             <a:r>
-              <a:rPr lang="en-US" sz="1400" dirty="0" smtClean="0"/>
+              <a:rPr lang="en-US" sz="1400" dirty="0"/>
               <a:t>An initial project scope was selected during the discussion.</a:t>
             </a:r>
           </a:p>
@@ -4710,27 +4748,27 @@
           </a:p>
           <a:p>
             <a:r>
-              <a:rPr lang="en-US" sz="1400" dirty="0" smtClean="0"/>
+              <a:rPr lang="en-US" sz="1400" dirty="0"/>
               <a:t>Decisions made: </a:t>
             </a:r>
           </a:p>
           <a:p>
             <a:r>
-              <a:rPr lang="en-US" sz="1400" dirty="0" smtClean="0"/>
+              <a:rPr lang="en-US" sz="1400" dirty="0"/>
               <a:t>Patty will propose initial scope				Mike will propose team composition</a:t>
             </a:r>
           </a:p>
           <a:p>
             <a:r>
-              <a:rPr lang="en-US" sz="1400" dirty="0" smtClean="0"/>
+              <a:rPr lang="en-US" sz="1400" dirty="0"/>
               <a:t>Giuseppe will create </a:t>
             </a:r>
             <a:r>
-              <a:rPr lang="en-US" sz="1400" dirty="0" err="1" smtClean="0"/>
+              <a:rPr lang="en-US" sz="1400" dirty="0" err="1"/>
               <a:t>github</a:t>
             </a:r>
             <a:r>
-              <a:rPr lang="en-US" sz="1400" dirty="0" smtClean="0"/>
+              <a:rPr lang="en-US" sz="1400" dirty="0"/>
               <a:t>				Gabriel will produce weekly report	</a:t>
             </a:r>
           </a:p>
@@ -4739,29 +4777,29 @@
           </a:p>
           <a:p>
             <a:r>
-              <a:rPr lang="en-US" sz="1400" u="sng" dirty="0" smtClean="0"/>
+              <a:rPr lang="en-US" sz="1400" u="sng" dirty="0"/>
               <a:t>Jan 22, 2018															</a:t>
             </a:r>
           </a:p>
           <a:p>
             <a:r>
-              <a:rPr lang="en-US" sz="1400" dirty="0" smtClean="0"/>
+              <a:rPr lang="en-US" sz="1400" dirty="0"/>
               <a:t>Team members collaborated via Slack to finalize scope document</a:t>
             </a:r>
           </a:p>
           <a:p>
             <a:r>
-              <a:rPr lang="en-US" sz="1400" dirty="0" smtClean="0"/>
+              <a:rPr lang="en-US" sz="1400" dirty="0"/>
               <a:t>Mike added base coding project for Health Application to </a:t>
             </a:r>
             <a:r>
-              <a:rPr lang="en-US" sz="1400" dirty="0" err="1" smtClean="0"/>
+              <a:rPr lang="en-US" sz="1400" dirty="0" err="1"/>
               <a:t>github</a:t>
             </a:r>
-            <a:endParaRPr lang="en-US" sz="1400" dirty="0" smtClean="0"/>
-          </a:p>
-          <a:p>
-            <a:endParaRPr lang="en-US" sz="1400" dirty="0" smtClean="0"/>
+            <a:endParaRPr lang="en-US" sz="1400" dirty="0"/>
+          </a:p>
+          <a:p>
+            <a:endParaRPr lang="en-US" sz="1400" dirty="0"/>
           </a:p>
         </p:txBody>
       </p:sp>
@@ -4775,13 +4813,6 @@
   <p:clrMapOvr>
     <a:masterClrMapping/>
   </p:clrMapOvr>
-  <p:timing>
-    <p:tnLst>
-      <p:par>
-        <p:cTn xmlns:p14="http://schemas.microsoft.com/office/powerpoint/2010/main" id="1" dur="indefinite" restart="never" nodeType="tmRoot"/>
-      </p:par>
-    </p:tnLst>
-  </p:timing>
 </p:sld>
 </file>
 

</xml_diff>